<commit_message>
Merging changes from trunk to branches/RB-2.0
Subversion: revision:9971
</commit_message>
<xml_diff>
--- a/doc/images/score-p-overview.pptx
+++ b/doc/images/score-p-overview.pptx
@@ -106,7 +106,7 @@
   </p:defaultTextStyle>
   <p:extLst>
     <p:ext uri="{EFAFB233-063F-42B5-8137-9DF3F51BA10A}">
-      <p15:sldGuideLst xmlns:p15="http://schemas.microsoft.com/office/powerpoint/2012/main" xmlns=""/>
+      <p15:sldGuideLst xmlns="" xmlns:p15="http://schemas.microsoft.com/office/powerpoint/2012/main"/>
     </p:ext>
   </p:extLst>
 </p:presentation>
@@ -243,7 +243,7 @@
           <a:p>
             <a:fld id="{B805A886-7B5C-4891-93D1-29873BD06F24}" type="datetimeFigureOut">
               <a:rPr lang="de-DE" smtClean="0"/>
-              <a:t>09.12.2015</a:t>
+              <a:t>10.12.2015</a:t>
             </a:fld>
             <a:endParaRPr lang="de-DE"/>
           </a:p>
@@ -285,7 +285,7 @@
           <a:p>
             <a:fld id="{C3FA991F-5CFE-4265-BA0A-3C6CB9B1C845}" type="slidenum">
               <a:rPr lang="de-DE" smtClean="0"/>
-              <a:t>‹#›</a:t>
+              <a:t>‹Nr.›</a:t>
             </a:fld>
             <a:endParaRPr lang="de-DE"/>
           </a:p>
@@ -413,7 +413,7 @@
           <a:p>
             <a:fld id="{B805A886-7B5C-4891-93D1-29873BD06F24}" type="datetimeFigureOut">
               <a:rPr lang="de-DE" smtClean="0"/>
-              <a:t>09.12.2015</a:t>
+              <a:t>10.12.2015</a:t>
             </a:fld>
             <a:endParaRPr lang="de-DE"/>
           </a:p>
@@ -455,7 +455,7 @@
           <a:p>
             <a:fld id="{C3FA991F-5CFE-4265-BA0A-3C6CB9B1C845}" type="slidenum">
               <a:rPr lang="de-DE" smtClean="0"/>
-              <a:t>‹#›</a:t>
+              <a:t>‹Nr.›</a:t>
             </a:fld>
             <a:endParaRPr lang="de-DE"/>
           </a:p>
@@ -593,7 +593,7 @@
           <a:p>
             <a:fld id="{B805A886-7B5C-4891-93D1-29873BD06F24}" type="datetimeFigureOut">
               <a:rPr lang="de-DE" smtClean="0"/>
-              <a:t>09.12.2015</a:t>
+              <a:t>10.12.2015</a:t>
             </a:fld>
             <a:endParaRPr lang="de-DE"/>
           </a:p>
@@ -635,7 +635,7 @@
           <a:p>
             <a:fld id="{C3FA991F-5CFE-4265-BA0A-3C6CB9B1C845}" type="slidenum">
               <a:rPr lang="de-DE" smtClean="0"/>
-              <a:t>‹#›</a:t>
+              <a:t>‹Nr.›</a:t>
             </a:fld>
             <a:endParaRPr lang="de-DE"/>
           </a:p>
@@ -763,7 +763,7 @@
           <a:p>
             <a:fld id="{B805A886-7B5C-4891-93D1-29873BD06F24}" type="datetimeFigureOut">
               <a:rPr lang="de-DE" smtClean="0"/>
-              <a:t>09.12.2015</a:t>
+              <a:t>10.12.2015</a:t>
             </a:fld>
             <a:endParaRPr lang="de-DE"/>
           </a:p>
@@ -805,7 +805,7 @@
           <a:p>
             <a:fld id="{C3FA991F-5CFE-4265-BA0A-3C6CB9B1C845}" type="slidenum">
               <a:rPr lang="de-DE" smtClean="0"/>
-              <a:t>‹#›</a:t>
+              <a:t>‹Nr.›</a:t>
             </a:fld>
             <a:endParaRPr lang="de-DE"/>
           </a:p>
@@ -1007,7 +1007,7 @@
           <a:p>
             <a:fld id="{B805A886-7B5C-4891-93D1-29873BD06F24}" type="datetimeFigureOut">
               <a:rPr lang="de-DE" smtClean="0"/>
-              <a:t>09.12.2015</a:t>
+              <a:t>10.12.2015</a:t>
             </a:fld>
             <a:endParaRPr lang="de-DE"/>
           </a:p>
@@ -1049,7 +1049,7 @@
           <a:p>
             <a:fld id="{C3FA991F-5CFE-4265-BA0A-3C6CB9B1C845}" type="slidenum">
               <a:rPr lang="de-DE" smtClean="0"/>
-              <a:t>‹#›</a:t>
+              <a:t>‹Nr.›</a:t>
             </a:fld>
             <a:endParaRPr lang="de-DE"/>
           </a:p>
@@ -1239,7 +1239,7 @@
           <a:p>
             <a:fld id="{B805A886-7B5C-4891-93D1-29873BD06F24}" type="datetimeFigureOut">
               <a:rPr lang="de-DE" smtClean="0"/>
-              <a:t>09.12.2015</a:t>
+              <a:t>10.12.2015</a:t>
             </a:fld>
             <a:endParaRPr lang="de-DE"/>
           </a:p>
@@ -1281,7 +1281,7 @@
           <a:p>
             <a:fld id="{C3FA991F-5CFE-4265-BA0A-3C6CB9B1C845}" type="slidenum">
               <a:rPr lang="de-DE" smtClean="0"/>
-              <a:t>‹#›</a:t>
+              <a:t>‹Nr.›</a:t>
             </a:fld>
             <a:endParaRPr lang="de-DE"/>
           </a:p>
@@ -1606,7 +1606,7 @@
           <a:p>
             <a:fld id="{B805A886-7B5C-4891-93D1-29873BD06F24}" type="datetimeFigureOut">
               <a:rPr lang="de-DE" smtClean="0"/>
-              <a:t>09.12.2015</a:t>
+              <a:t>10.12.2015</a:t>
             </a:fld>
             <a:endParaRPr lang="de-DE"/>
           </a:p>
@@ -1648,7 +1648,7 @@
           <a:p>
             <a:fld id="{C3FA991F-5CFE-4265-BA0A-3C6CB9B1C845}" type="slidenum">
               <a:rPr lang="de-DE" smtClean="0"/>
-              <a:t>‹#›</a:t>
+              <a:t>‹Nr.›</a:t>
             </a:fld>
             <a:endParaRPr lang="de-DE"/>
           </a:p>
@@ -1724,7 +1724,7 @@
           <a:p>
             <a:fld id="{B805A886-7B5C-4891-93D1-29873BD06F24}" type="datetimeFigureOut">
               <a:rPr lang="de-DE" smtClean="0"/>
-              <a:t>09.12.2015</a:t>
+              <a:t>10.12.2015</a:t>
             </a:fld>
             <a:endParaRPr lang="de-DE"/>
           </a:p>
@@ -1766,7 +1766,7 @@
           <a:p>
             <a:fld id="{C3FA991F-5CFE-4265-BA0A-3C6CB9B1C845}" type="slidenum">
               <a:rPr lang="de-DE" smtClean="0"/>
-              <a:t>‹#›</a:t>
+              <a:t>‹Nr.›</a:t>
             </a:fld>
             <a:endParaRPr lang="de-DE"/>
           </a:p>
@@ -1819,7 +1819,7 @@
           <a:p>
             <a:fld id="{B805A886-7B5C-4891-93D1-29873BD06F24}" type="datetimeFigureOut">
               <a:rPr lang="de-DE" smtClean="0"/>
-              <a:t>09.12.2015</a:t>
+              <a:t>10.12.2015</a:t>
             </a:fld>
             <a:endParaRPr lang="de-DE"/>
           </a:p>
@@ -1861,7 +1861,7 @@
           <a:p>
             <a:fld id="{C3FA991F-5CFE-4265-BA0A-3C6CB9B1C845}" type="slidenum">
               <a:rPr lang="de-DE" smtClean="0"/>
-              <a:t>‹#›</a:t>
+              <a:t>‹Nr.›</a:t>
             </a:fld>
             <a:endParaRPr lang="de-DE"/>
           </a:p>
@@ -2096,7 +2096,7 @@
           <a:p>
             <a:fld id="{B805A886-7B5C-4891-93D1-29873BD06F24}" type="datetimeFigureOut">
               <a:rPr lang="de-DE" smtClean="0"/>
-              <a:t>09.12.2015</a:t>
+              <a:t>10.12.2015</a:t>
             </a:fld>
             <a:endParaRPr lang="de-DE"/>
           </a:p>
@@ -2138,7 +2138,7 @@
           <a:p>
             <a:fld id="{C3FA991F-5CFE-4265-BA0A-3C6CB9B1C845}" type="slidenum">
               <a:rPr lang="de-DE" smtClean="0"/>
-              <a:t>‹#›</a:t>
+              <a:t>‹Nr.›</a:t>
             </a:fld>
             <a:endParaRPr lang="de-DE"/>
           </a:p>
@@ -2353,7 +2353,7 @@
           <a:p>
             <a:fld id="{B805A886-7B5C-4891-93D1-29873BD06F24}" type="datetimeFigureOut">
               <a:rPr lang="de-DE" smtClean="0"/>
-              <a:t>09.12.2015</a:t>
+              <a:t>10.12.2015</a:t>
             </a:fld>
             <a:endParaRPr lang="de-DE"/>
           </a:p>
@@ -2395,7 +2395,7 @@
           <a:p>
             <a:fld id="{C3FA991F-5CFE-4265-BA0A-3C6CB9B1C845}" type="slidenum">
               <a:rPr lang="de-DE" smtClean="0"/>
-              <a:t>‹#›</a:t>
+              <a:t>‹Nr.›</a:t>
             </a:fld>
             <a:endParaRPr lang="de-DE"/>
           </a:p>
@@ -2566,7 +2566,7 @@
           <a:p>
             <a:fld id="{B805A886-7B5C-4891-93D1-29873BD06F24}" type="datetimeFigureOut">
               <a:rPr lang="de-DE" smtClean="0"/>
-              <a:t>09.12.2015</a:t>
+              <a:t>10.12.2015</a:t>
             </a:fld>
             <a:endParaRPr lang="de-DE"/>
           </a:p>
@@ -2644,7 +2644,7 @@
           <a:p>
             <a:fld id="{C3FA991F-5CFE-4265-BA0A-3C6CB9B1C845}" type="slidenum">
               <a:rPr lang="de-DE" smtClean="0"/>
-              <a:t>‹#›</a:t>
+              <a:t>‹Nr.›</a:t>
             </a:fld>
             <a:endParaRPr lang="de-DE"/>
           </a:p>
@@ -6257,7 +6257,7 @@
               </a:pathLst>
             </a:custGeom>
             <a:solidFill>
-              <a:srgbClr val="008000"/>
+              <a:srgbClr val="376092"/>
             </a:solidFill>
             <a:ln w="9360">
               <a:noFill/>
@@ -6266,131 +6266,7 @@
           </p:spPr>
           <p:txBody>
             <a:bodyPr lIns="90000" tIns="45000" rIns="90000" bIns="45000" anchor="ctr" compatLnSpc="0"/>
-            <a:lstStyle>
-              <a:defPPr>
-                <a:defRPr lang="en-US"/>
-              </a:defPPr>
-              <a:lvl1pPr algn="l" rtl="0" fontAlgn="base">
-                <a:spcBef>
-                  <a:spcPct val="0"/>
-                </a:spcBef>
-                <a:spcAft>
-                  <a:spcPct val="0"/>
-                </a:spcAft>
-                <a:defRPr kern="1200">
-                  <a:solidFill>
-                    <a:schemeClr val="tx1"/>
-                  </a:solidFill>
-                  <a:latin typeface="Arial" pitchFamily="34" charset="0"/>
-                  <a:ea typeface="ＭＳ Ｐゴシック" pitchFamily="34" charset="-128"/>
-                  <a:cs typeface="+mn-cs"/>
-                </a:defRPr>
-              </a:lvl1pPr>
-              <a:lvl2pPr marL="457200" algn="l" rtl="0" fontAlgn="base">
-                <a:spcBef>
-                  <a:spcPct val="0"/>
-                </a:spcBef>
-                <a:spcAft>
-                  <a:spcPct val="0"/>
-                </a:spcAft>
-                <a:defRPr kern="1200">
-                  <a:solidFill>
-                    <a:schemeClr val="tx1"/>
-                  </a:solidFill>
-                  <a:latin typeface="Arial" pitchFamily="34" charset="0"/>
-                  <a:ea typeface="ＭＳ Ｐゴシック" pitchFamily="34" charset="-128"/>
-                  <a:cs typeface="+mn-cs"/>
-                </a:defRPr>
-              </a:lvl2pPr>
-              <a:lvl3pPr marL="914400" algn="l" rtl="0" fontAlgn="base">
-                <a:spcBef>
-                  <a:spcPct val="0"/>
-                </a:spcBef>
-                <a:spcAft>
-                  <a:spcPct val="0"/>
-                </a:spcAft>
-                <a:defRPr kern="1200">
-                  <a:solidFill>
-                    <a:schemeClr val="tx1"/>
-                  </a:solidFill>
-                  <a:latin typeface="Arial" pitchFamily="34" charset="0"/>
-                  <a:ea typeface="ＭＳ Ｐゴシック" pitchFamily="34" charset="-128"/>
-                  <a:cs typeface="+mn-cs"/>
-                </a:defRPr>
-              </a:lvl3pPr>
-              <a:lvl4pPr marL="1371600" algn="l" rtl="0" fontAlgn="base">
-                <a:spcBef>
-                  <a:spcPct val="0"/>
-                </a:spcBef>
-                <a:spcAft>
-                  <a:spcPct val="0"/>
-                </a:spcAft>
-                <a:defRPr kern="1200">
-                  <a:solidFill>
-                    <a:schemeClr val="tx1"/>
-                  </a:solidFill>
-                  <a:latin typeface="Arial" pitchFamily="34" charset="0"/>
-                  <a:ea typeface="ＭＳ Ｐゴシック" pitchFamily="34" charset="-128"/>
-                  <a:cs typeface="+mn-cs"/>
-                </a:defRPr>
-              </a:lvl4pPr>
-              <a:lvl5pPr marL="1828800" algn="l" rtl="0" fontAlgn="base">
-                <a:spcBef>
-                  <a:spcPct val="0"/>
-                </a:spcBef>
-                <a:spcAft>
-                  <a:spcPct val="0"/>
-                </a:spcAft>
-                <a:defRPr kern="1200">
-                  <a:solidFill>
-                    <a:schemeClr val="tx1"/>
-                  </a:solidFill>
-                  <a:latin typeface="Arial" pitchFamily="34" charset="0"/>
-                  <a:ea typeface="ＭＳ Ｐゴシック" pitchFamily="34" charset="-128"/>
-                  <a:cs typeface="+mn-cs"/>
-                </a:defRPr>
-              </a:lvl5pPr>
-              <a:lvl6pPr marL="2286000" algn="l" defTabSz="914400" rtl="0" eaLnBrk="1" latinLnBrk="0" hangingPunct="1">
-                <a:defRPr kern="1200">
-                  <a:solidFill>
-                    <a:schemeClr val="tx1"/>
-                  </a:solidFill>
-                  <a:latin typeface="Arial" pitchFamily="34" charset="0"/>
-                  <a:ea typeface="ＭＳ Ｐゴシック" pitchFamily="34" charset="-128"/>
-                  <a:cs typeface="+mn-cs"/>
-                </a:defRPr>
-              </a:lvl6pPr>
-              <a:lvl7pPr marL="2743200" algn="l" defTabSz="914400" rtl="0" eaLnBrk="1" latinLnBrk="0" hangingPunct="1">
-                <a:defRPr kern="1200">
-                  <a:solidFill>
-                    <a:schemeClr val="tx1"/>
-                  </a:solidFill>
-                  <a:latin typeface="Arial" pitchFamily="34" charset="0"/>
-                  <a:ea typeface="ＭＳ Ｐゴシック" pitchFamily="34" charset="-128"/>
-                  <a:cs typeface="+mn-cs"/>
-                </a:defRPr>
-              </a:lvl7pPr>
-              <a:lvl8pPr marL="3200400" algn="l" defTabSz="914400" rtl="0" eaLnBrk="1" latinLnBrk="0" hangingPunct="1">
-                <a:defRPr kern="1200">
-                  <a:solidFill>
-                    <a:schemeClr val="tx1"/>
-                  </a:solidFill>
-                  <a:latin typeface="Arial" pitchFamily="34" charset="0"/>
-                  <a:ea typeface="ＭＳ Ｐゴシック" pitchFamily="34" charset="-128"/>
-                  <a:cs typeface="+mn-cs"/>
-                </a:defRPr>
-              </a:lvl8pPr>
-              <a:lvl9pPr marL="3657600" algn="l" defTabSz="914400" rtl="0" eaLnBrk="1" latinLnBrk="0" hangingPunct="1">
-                <a:defRPr kern="1200">
-                  <a:solidFill>
-                    <a:schemeClr val="tx1"/>
-                  </a:solidFill>
-                  <a:latin typeface="Arial" pitchFamily="34" charset="0"/>
-                  <a:ea typeface="ＭＳ Ｐゴシック" pitchFamily="34" charset="-128"/>
-                  <a:cs typeface="+mn-cs"/>
-                </a:defRPr>
-              </a:lvl9pPr>
-            </a:lstStyle>
+            <a:lstStyle/>
             <a:p>
               <a:pPr algn="ctr">
                 <a:spcBef>
@@ -6410,8 +6286,60 @@
                   <a:ea typeface="Arial Unicode MS" pitchFamily="2"/>
                   <a:cs typeface="Tahoma" pitchFamily="2"/>
                 </a:rPr>
-                <a:t>User instrumentation</a:t>
+                <a:t>Sampling</a:t>
               </a:r>
+            </a:p>
+            <a:p>
+              <a:pPr algn="ctr">
+                <a:spcBef>
+                  <a:spcPts val="0"/>
+                </a:spcBef>
+                <a:spcAft>
+                  <a:spcPts val="0"/>
+                </a:spcAft>
+                <a:defRPr/>
+              </a:pPr>
+              <a:r>
+                <a:rPr lang="en-US" sz="1200" dirty="0">
+                  <a:solidFill>
+                    <a:srgbClr val="FFFFFF"/>
+                  </a:solidFill>
+                  <a:latin typeface="Arial" pitchFamily="34"/>
+                  <a:ea typeface="Arial Unicode MS" pitchFamily="2"/>
+                  <a:cs typeface="Tahoma" pitchFamily="2"/>
+                </a:rPr>
+                <a:t>Interrupts</a:t>
+              </a:r>
+            </a:p>
+            <a:p>
+              <a:pPr algn="ctr">
+                <a:spcBef>
+                  <a:spcPts val="0"/>
+                </a:spcBef>
+                <a:spcAft>
+                  <a:spcPts val="0"/>
+                </a:spcAft>
+                <a:defRPr/>
+              </a:pPr>
+              <a:r>
+                <a:rPr lang="en-US" sz="1200" dirty="0">
+                  <a:solidFill>
+                    <a:srgbClr val="FFFFFF"/>
+                  </a:solidFill>
+                  <a:latin typeface="Arial" pitchFamily="34"/>
+                  <a:ea typeface="Arial Unicode MS" pitchFamily="2"/>
+                  <a:cs typeface="Tahoma" pitchFamily="2"/>
+                </a:rPr>
+                <a:t>(PAPI, PERF)</a:t>
+              </a:r>
+              <a:endParaRPr lang="en-US" sz="1200" dirty="0">
+                <a:solidFill>
+                  <a:srgbClr val="FFFFFF"/>
+                </a:solidFill>
+                <a:latin typeface="Arial" pitchFamily="34"/>
+                <a:ea typeface="Arial Unicode MS" pitchFamily="2"/>
+                <a:cs typeface="Tahoma" pitchFamily="2"/>
+              </a:endParaRPr>
             </a:p>
           </p:txBody>
         </p:sp>
@@ -7592,249 +7520,6 @@
         </p:sp>
         <p:sp>
           <p:nvSpPr>
-            <p:cNvPr id="58" name="Rectangle 21"/>
-            <p:cNvSpPr/>
-            <p:nvPr/>
-          </p:nvSpPr>
-          <p:spPr bwMode="auto">
-            <a:xfrm>
-              <a:off x="695095" y="3163728"/>
-              <a:ext cx="3291728" cy="407787"/>
-            </a:xfrm>
-            <a:custGeom>
-              <a:avLst/>
-              <a:gdLst>
-                <a:gd name="f0" fmla="val 0"/>
-                <a:gd name="f1" fmla="val 21600"/>
-              </a:gdLst>
-              <a:ahLst/>
-              <a:cxnLst>
-                <a:cxn ang="3cd4">
-                  <a:pos x="hc" y="t"/>
-                </a:cxn>
-                <a:cxn ang="0">
-                  <a:pos x="r" y="vc"/>
-                </a:cxn>
-                <a:cxn ang="cd4">
-                  <a:pos x="hc" y="b"/>
-                </a:cxn>
-                <a:cxn ang="cd2">
-                  <a:pos x="l" y="vc"/>
-                </a:cxn>
-              </a:cxnLst>
-              <a:rect l="l" t="t" r="r" b="b"/>
-              <a:pathLst>
-                <a:path w="21600" h="21600">
-                  <a:moveTo>
-                    <a:pt x="f0" y="f0"/>
-                  </a:moveTo>
-                  <a:lnTo>
-                    <a:pt x="f1" y="f0"/>
-                  </a:lnTo>
-                  <a:lnTo>
-                    <a:pt x="f1" y="f1"/>
-                  </a:lnTo>
-                  <a:lnTo>
-                    <a:pt x="f0" y="f1"/>
-                  </a:lnTo>
-                  <a:lnTo>
-                    <a:pt x="f0" y="f0"/>
-                  </a:lnTo>
-                  <a:close/>
-                </a:path>
-              </a:pathLst>
-            </a:custGeom>
-            <a:solidFill>
-              <a:srgbClr val="376092"/>
-            </a:solidFill>
-            <a:ln w="9360">
-              <a:noFill/>
-              <a:prstDash val="solid"/>
-            </a:ln>
-          </p:spPr>
-          <p:txBody>
-            <a:bodyPr lIns="90000" tIns="45000" rIns="90000" bIns="45000" anchor="ctr" compatLnSpc="0"/>
-            <a:lstStyle>
-              <a:defPPr>
-                <a:defRPr lang="en-US"/>
-              </a:defPPr>
-              <a:lvl1pPr algn="l" rtl="0" fontAlgn="base">
-                <a:spcBef>
-                  <a:spcPct val="0"/>
-                </a:spcBef>
-                <a:spcAft>
-                  <a:spcPct val="0"/>
-                </a:spcAft>
-                <a:defRPr kern="1200">
-                  <a:solidFill>
-                    <a:schemeClr val="tx1"/>
-                  </a:solidFill>
-                  <a:latin typeface="Arial" pitchFamily="34" charset="0"/>
-                  <a:ea typeface="ＭＳ Ｐゴシック" pitchFamily="34" charset="-128"/>
-                  <a:cs typeface="+mn-cs"/>
-                </a:defRPr>
-              </a:lvl1pPr>
-              <a:lvl2pPr marL="457200" algn="l" rtl="0" fontAlgn="base">
-                <a:spcBef>
-                  <a:spcPct val="0"/>
-                </a:spcBef>
-                <a:spcAft>
-                  <a:spcPct val="0"/>
-                </a:spcAft>
-                <a:defRPr kern="1200">
-                  <a:solidFill>
-                    <a:schemeClr val="tx1"/>
-                  </a:solidFill>
-                  <a:latin typeface="Arial" pitchFamily="34" charset="0"/>
-                  <a:ea typeface="ＭＳ Ｐゴシック" pitchFamily="34" charset="-128"/>
-                  <a:cs typeface="+mn-cs"/>
-                </a:defRPr>
-              </a:lvl2pPr>
-              <a:lvl3pPr marL="914400" algn="l" rtl="0" fontAlgn="base">
-                <a:spcBef>
-                  <a:spcPct val="0"/>
-                </a:spcBef>
-                <a:spcAft>
-                  <a:spcPct val="0"/>
-                </a:spcAft>
-                <a:defRPr kern="1200">
-                  <a:solidFill>
-                    <a:schemeClr val="tx1"/>
-                  </a:solidFill>
-                  <a:latin typeface="Arial" pitchFamily="34" charset="0"/>
-                  <a:ea typeface="ＭＳ Ｐゴシック" pitchFamily="34" charset="-128"/>
-                  <a:cs typeface="+mn-cs"/>
-                </a:defRPr>
-              </a:lvl3pPr>
-              <a:lvl4pPr marL="1371600" algn="l" rtl="0" fontAlgn="base">
-                <a:spcBef>
-                  <a:spcPct val="0"/>
-                </a:spcBef>
-                <a:spcAft>
-                  <a:spcPct val="0"/>
-                </a:spcAft>
-                <a:defRPr kern="1200">
-                  <a:solidFill>
-                    <a:schemeClr val="tx1"/>
-                  </a:solidFill>
-                  <a:latin typeface="Arial" pitchFamily="34" charset="0"/>
-                  <a:ea typeface="ＭＳ Ｐゴシック" pitchFamily="34" charset="-128"/>
-                  <a:cs typeface="+mn-cs"/>
-                </a:defRPr>
-              </a:lvl4pPr>
-              <a:lvl5pPr marL="1828800" algn="l" rtl="0" fontAlgn="base">
-                <a:spcBef>
-                  <a:spcPct val="0"/>
-                </a:spcBef>
-                <a:spcAft>
-                  <a:spcPct val="0"/>
-                </a:spcAft>
-                <a:defRPr kern="1200">
-                  <a:solidFill>
-                    <a:schemeClr val="tx1"/>
-                  </a:solidFill>
-                  <a:latin typeface="Arial" pitchFamily="34" charset="0"/>
-                  <a:ea typeface="ＭＳ Ｐゴシック" pitchFamily="34" charset="-128"/>
-                  <a:cs typeface="+mn-cs"/>
-                </a:defRPr>
-              </a:lvl5pPr>
-              <a:lvl6pPr marL="2286000" algn="l" defTabSz="914400" rtl="0" eaLnBrk="1" latinLnBrk="0" hangingPunct="1">
-                <a:defRPr kern="1200">
-                  <a:solidFill>
-                    <a:schemeClr val="tx1"/>
-                  </a:solidFill>
-                  <a:latin typeface="Arial" pitchFamily="34" charset="0"/>
-                  <a:ea typeface="ＭＳ Ｐゴシック" pitchFamily="34" charset="-128"/>
-                  <a:cs typeface="+mn-cs"/>
-                </a:defRPr>
-              </a:lvl6pPr>
-              <a:lvl7pPr marL="2743200" algn="l" defTabSz="914400" rtl="0" eaLnBrk="1" latinLnBrk="0" hangingPunct="1">
-                <a:defRPr kern="1200">
-                  <a:solidFill>
-                    <a:schemeClr val="tx1"/>
-                  </a:solidFill>
-                  <a:latin typeface="Arial" pitchFamily="34" charset="0"/>
-                  <a:ea typeface="ＭＳ Ｐゴシック" pitchFamily="34" charset="-128"/>
-                  <a:cs typeface="+mn-cs"/>
-                </a:defRPr>
-              </a:lvl7pPr>
-              <a:lvl8pPr marL="3200400" algn="l" defTabSz="914400" rtl="0" eaLnBrk="1" latinLnBrk="0" hangingPunct="1">
-                <a:defRPr kern="1200">
-                  <a:solidFill>
-                    <a:schemeClr val="tx1"/>
-                  </a:solidFill>
-                  <a:latin typeface="Arial" pitchFamily="34" charset="0"/>
-                  <a:ea typeface="ＭＳ Ｐゴシック" pitchFamily="34" charset="-128"/>
-                  <a:cs typeface="+mn-cs"/>
-                </a:defRPr>
-              </a:lvl8pPr>
-              <a:lvl9pPr marL="3657600" algn="l" defTabSz="914400" rtl="0" eaLnBrk="1" latinLnBrk="0" hangingPunct="1">
-                <a:defRPr kern="1200">
-                  <a:solidFill>
-                    <a:schemeClr val="tx1"/>
-                  </a:solidFill>
-                  <a:latin typeface="Arial" pitchFamily="34" charset="0"/>
-                  <a:ea typeface="ＭＳ Ｐゴシック" pitchFamily="34" charset="-128"/>
-                  <a:cs typeface="+mn-cs"/>
-                </a:defRPr>
-              </a:lvl9pPr>
-            </a:lstStyle>
-            <a:p>
-              <a:pPr algn="ctr">
-                <a:spcBef>
-                  <a:spcPts val="0"/>
-                </a:spcBef>
-                <a:spcAft>
-                  <a:spcPts val="0"/>
-                </a:spcAft>
-                <a:defRPr/>
-              </a:pPr>
-              <a:r>
-                <a:rPr lang="en-US" sz="1200" dirty="0">
-                  <a:solidFill>
-                    <a:srgbClr val="FFFFFF"/>
-                  </a:solidFill>
-                  <a:latin typeface="Arial" pitchFamily="34"/>
-                  <a:ea typeface="Arial Unicode MS" pitchFamily="2"/>
-                  <a:cs typeface="Tahoma" pitchFamily="2"/>
-                </a:rPr>
-                <a:t>Hardware counter (PAPI, </a:t>
-              </a:r>
-              <a:r>
-                <a:rPr lang="en-US" sz="1200" dirty="0" err="1" smtClean="0">
-                  <a:solidFill>
-                    <a:srgbClr val="FFFFFF"/>
-                  </a:solidFill>
-                  <a:latin typeface="Arial" pitchFamily="34"/>
-                  <a:ea typeface="Arial Unicode MS" pitchFamily="2"/>
-                  <a:cs typeface="Tahoma" pitchFamily="2"/>
-                </a:rPr>
-                <a:t>rusage</a:t>
-              </a:r>
-              <a:r>
-                <a:rPr lang="en-US" sz="1200" dirty="0" smtClean="0">
-                  <a:solidFill>
-                    <a:srgbClr val="FFFFFF"/>
-                  </a:solidFill>
-                  <a:latin typeface="Arial" pitchFamily="34"/>
-                  <a:ea typeface="Arial Unicode MS" pitchFamily="2"/>
-                  <a:cs typeface="Tahoma" pitchFamily="2"/>
-                </a:rPr>
-                <a:t>, PERF, plugins)</a:t>
-              </a:r>
-              <a:endParaRPr lang="en-US" sz="1200" dirty="0">
-                <a:solidFill>
-                  <a:srgbClr val="FFFFFF"/>
-                </a:solidFill>
-                <a:latin typeface="Arial" pitchFamily="34"/>
-                <a:ea typeface="Arial Unicode MS" pitchFamily="2"/>
-                <a:cs typeface="Tahoma" pitchFamily="2"/>
-              </a:endParaRPr>
-            </a:p>
-          </p:txBody>
-        </p:sp>
-        <p:sp>
-          <p:nvSpPr>
             <p:cNvPr id="59" name="Up Arrow 35"/>
             <p:cNvSpPr/>
             <p:nvPr/>
@@ -9095,7 +8780,7 @@
           <p:spPr>
             <a:xfrm>
               <a:off x="645338" y="4314188"/>
-              <a:ext cx="7849120" cy="418951"/>
+              <a:ext cx="6216454" cy="418951"/>
             </a:xfrm>
             <a:custGeom>
               <a:avLst/>
@@ -9501,7 +9186,7 @@
                 <a:defRPr/>
               </a:pPr>
               <a:r>
-                <a:rPr lang="en-US" sz="1200" dirty="0">
+                <a:rPr lang="en-US" sz="1200" dirty="0" smtClean="0">
                   <a:solidFill>
                     <a:srgbClr val="FFFFFF"/>
                   </a:solidFill>
@@ -9509,8 +9194,60 @@
                   <a:ea typeface="Arial Unicode MS" pitchFamily="2"/>
                   <a:cs typeface="Tahoma" pitchFamily="2"/>
                 </a:rPr>
-                <a:t>Source code instrumentation</a:t>
+                <a:t>Source </a:t>
               </a:r>
+              <a:r>
+                <a:rPr lang="en-US" sz="1200" dirty="0">
+                  <a:solidFill>
+                    <a:srgbClr val="FFFFFF"/>
+                  </a:solidFill>
+                  <a:latin typeface="Arial" pitchFamily="34"/>
+                  <a:ea typeface="Arial Unicode MS" pitchFamily="2"/>
+                  <a:cs typeface="Tahoma" pitchFamily="2"/>
+                </a:rPr>
+                <a:t>code instrumentation</a:t>
+              </a:r>
+            </a:p>
+            <a:p>
+              <a:pPr algn="ctr">
+                <a:spcBef>
+                  <a:spcPts val="0"/>
+                </a:spcBef>
+                <a:spcAft>
+                  <a:spcPts val="0"/>
+                </a:spcAft>
+                <a:defRPr/>
+              </a:pPr>
+              <a:r>
+                <a:rPr lang="en-US" sz="1200" dirty="0">
+                  <a:solidFill>
+                    <a:srgbClr val="FFFFFF"/>
+                  </a:solidFill>
+                  <a:latin typeface="Arial" pitchFamily="34"/>
+                  <a:ea typeface="Arial Unicode MS" pitchFamily="2"/>
+                  <a:cs typeface="Tahoma" pitchFamily="2"/>
+                </a:rPr>
+                <a:t>(Compiler, PDT, User</a:t>
+              </a:r>
+              <a:r>
+                <a:rPr lang="en-US" sz="1200" dirty="0" smtClean="0">
+                  <a:solidFill>
+                    <a:srgbClr val="FFFFFF"/>
+                  </a:solidFill>
+                  <a:latin typeface="Arial" pitchFamily="34"/>
+                  <a:ea typeface="Arial Unicode MS" pitchFamily="2"/>
+                  <a:cs typeface="Tahoma" pitchFamily="2"/>
+                </a:rPr>
+                <a:t>)</a:t>
+              </a:r>
+              <a:endParaRPr lang="en-US" sz="1200" dirty="0">
+                <a:solidFill>
+                  <a:srgbClr val="FFFFFF"/>
+                </a:solidFill>
+                <a:latin typeface="Arial" pitchFamily="34"/>
+                <a:ea typeface="Arial Unicode MS" pitchFamily="2"/>
+                <a:cs typeface="Tahoma" pitchFamily="2"/>
+              </a:endParaRPr>
             </a:p>
           </p:txBody>
         </p:sp>
@@ -10600,6 +10337,253 @@
             </a:p>
           </p:txBody>
         </p:sp>
+        <p:sp>
+          <p:nvSpPr>
+            <p:cNvPr id="37" name="Rectangle 21"/>
+            <p:cNvSpPr/>
+            <p:nvPr/>
+          </p:nvSpPr>
+          <p:spPr bwMode="auto">
+            <a:xfrm>
+              <a:off x="503218" y="3175912"/>
+              <a:ext cx="2149129" cy="407787"/>
+            </a:xfrm>
+            <a:prstGeom prst="homePlate">
+              <a:avLst/>
+            </a:prstGeom>
+            <a:solidFill>
+              <a:srgbClr val="376092"/>
+            </a:solidFill>
+            <a:ln w="9360">
+              <a:noFill/>
+              <a:prstDash val="solid"/>
+            </a:ln>
+          </p:spPr>
+          <p:txBody>
+            <a:bodyPr lIns="90000" tIns="45000" rIns="90000" bIns="45000" anchor="ctr" compatLnSpc="0"/>
+            <a:lstStyle>
+              <a:defPPr>
+                <a:defRPr lang="en-US"/>
+              </a:defPPr>
+              <a:lvl1pPr algn="l" rtl="0" fontAlgn="base">
+                <a:spcBef>
+                  <a:spcPct val="0"/>
+                </a:spcBef>
+                <a:spcAft>
+                  <a:spcPct val="0"/>
+                </a:spcAft>
+                <a:defRPr kern="1200">
+                  <a:solidFill>
+                    <a:schemeClr val="tx1"/>
+                  </a:solidFill>
+                  <a:latin typeface="Arial" pitchFamily="34" charset="0"/>
+                  <a:ea typeface="ＭＳ Ｐゴシック" pitchFamily="34" charset="-128"/>
+                  <a:cs typeface="+mn-cs"/>
+                </a:defRPr>
+              </a:lvl1pPr>
+              <a:lvl2pPr marL="457200" algn="l" rtl="0" fontAlgn="base">
+                <a:spcBef>
+                  <a:spcPct val="0"/>
+                </a:spcBef>
+                <a:spcAft>
+                  <a:spcPct val="0"/>
+                </a:spcAft>
+                <a:defRPr kern="1200">
+                  <a:solidFill>
+                    <a:schemeClr val="tx1"/>
+                  </a:solidFill>
+                  <a:latin typeface="Arial" pitchFamily="34" charset="0"/>
+                  <a:ea typeface="ＭＳ Ｐゴシック" pitchFamily="34" charset="-128"/>
+                  <a:cs typeface="+mn-cs"/>
+                </a:defRPr>
+              </a:lvl2pPr>
+              <a:lvl3pPr marL="914400" algn="l" rtl="0" fontAlgn="base">
+                <a:spcBef>
+                  <a:spcPct val="0"/>
+                </a:spcBef>
+                <a:spcAft>
+                  <a:spcPct val="0"/>
+                </a:spcAft>
+                <a:defRPr kern="1200">
+                  <a:solidFill>
+                    <a:schemeClr val="tx1"/>
+                  </a:solidFill>
+                  <a:latin typeface="Arial" pitchFamily="34" charset="0"/>
+                  <a:ea typeface="ＭＳ Ｐゴシック" pitchFamily="34" charset="-128"/>
+                  <a:cs typeface="+mn-cs"/>
+                </a:defRPr>
+              </a:lvl3pPr>
+              <a:lvl4pPr marL="1371600" algn="l" rtl="0" fontAlgn="base">
+                <a:spcBef>
+                  <a:spcPct val="0"/>
+                </a:spcBef>
+                <a:spcAft>
+                  <a:spcPct val="0"/>
+                </a:spcAft>
+                <a:defRPr kern="1200">
+                  <a:solidFill>
+                    <a:schemeClr val="tx1"/>
+                  </a:solidFill>
+                  <a:latin typeface="Arial" pitchFamily="34" charset="0"/>
+                  <a:ea typeface="ＭＳ Ｐゴシック" pitchFamily="34" charset="-128"/>
+                  <a:cs typeface="+mn-cs"/>
+                </a:defRPr>
+              </a:lvl4pPr>
+              <a:lvl5pPr marL="1828800" algn="l" rtl="0" fontAlgn="base">
+                <a:spcBef>
+                  <a:spcPct val="0"/>
+                </a:spcBef>
+                <a:spcAft>
+                  <a:spcPct val="0"/>
+                </a:spcAft>
+                <a:defRPr kern="1200">
+                  <a:solidFill>
+                    <a:schemeClr val="tx1"/>
+                  </a:solidFill>
+                  <a:latin typeface="Arial" pitchFamily="34" charset="0"/>
+                  <a:ea typeface="ＭＳ Ｐゴシック" pitchFamily="34" charset="-128"/>
+                  <a:cs typeface="+mn-cs"/>
+                </a:defRPr>
+              </a:lvl5pPr>
+              <a:lvl6pPr marL="2286000" algn="l" defTabSz="914400" rtl="0" eaLnBrk="1" latinLnBrk="0" hangingPunct="1">
+                <a:defRPr kern="1200">
+                  <a:solidFill>
+                    <a:schemeClr val="tx1"/>
+                  </a:solidFill>
+                  <a:latin typeface="Arial" pitchFamily="34" charset="0"/>
+                  <a:ea typeface="ＭＳ Ｐゴシック" pitchFamily="34" charset="-128"/>
+                  <a:cs typeface="+mn-cs"/>
+                </a:defRPr>
+              </a:lvl6pPr>
+              <a:lvl7pPr marL="2743200" algn="l" defTabSz="914400" rtl="0" eaLnBrk="1" latinLnBrk="0" hangingPunct="1">
+                <a:defRPr kern="1200">
+                  <a:solidFill>
+                    <a:schemeClr val="tx1"/>
+                  </a:solidFill>
+                  <a:latin typeface="Arial" pitchFamily="34" charset="0"/>
+                  <a:ea typeface="ＭＳ Ｐゴシック" pitchFamily="34" charset="-128"/>
+                  <a:cs typeface="+mn-cs"/>
+                </a:defRPr>
+              </a:lvl7pPr>
+              <a:lvl8pPr marL="3200400" algn="l" defTabSz="914400" rtl="0" eaLnBrk="1" latinLnBrk="0" hangingPunct="1">
+                <a:defRPr kern="1200">
+                  <a:solidFill>
+                    <a:schemeClr val="tx1"/>
+                  </a:solidFill>
+                  <a:latin typeface="Arial" pitchFamily="34" charset="0"/>
+                  <a:ea typeface="ＭＳ Ｐゴシック" pitchFamily="34" charset="-128"/>
+                  <a:cs typeface="+mn-cs"/>
+                </a:defRPr>
+              </a:lvl8pPr>
+              <a:lvl9pPr marL="3657600" algn="l" defTabSz="914400" rtl="0" eaLnBrk="1" latinLnBrk="0" hangingPunct="1">
+                <a:defRPr kern="1200">
+                  <a:solidFill>
+                    <a:schemeClr val="tx1"/>
+                  </a:solidFill>
+                  <a:latin typeface="Arial" pitchFamily="34" charset="0"/>
+                  <a:ea typeface="ＭＳ Ｐゴシック" pitchFamily="34" charset="-128"/>
+                  <a:cs typeface="+mn-cs"/>
+                </a:defRPr>
+              </a:lvl9pPr>
+            </a:lstStyle>
+            <a:p>
+              <a:pPr algn="ctr">
+                <a:spcBef>
+                  <a:spcPts val="0"/>
+                </a:spcBef>
+                <a:spcAft>
+                  <a:spcPts val="0"/>
+                </a:spcAft>
+                <a:defRPr/>
+              </a:pPr>
+              <a:r>
+                <a:rPr lang="en-US" sz="1200" dirty="0">
+                  <a:solidFill>
+                    <a:srgbClr val="FFFFFF"/>
+                  </a:solidFill>
+                  <a:latin typeface="Arial" pitchFamily="34"/>
+                  <a:ea typeface="Arial Unicode MS" pitchFamily="2"/>
+                  <a:cs typeface="Tahoma" pitchFamily="2"/>
+                </a:rPr>
+                <a:t>Hardware </a:t>
+              </a:r>
+              <a:r>
+                <a:rPr lang="en-US" sz="1200" dirty="0" smtClean="0">
+                  <a:solidFill>
+                    <a:srgbClr val="FFFFFF"/>
+                  </a:solidFill>
+                  <a:latin typeface="Arial" pitchFamily="34"/>
+                  <a:ea typeface="Arial Unicode MS" pitchFamily="2"/>
+                  <a:cs typeface="Tahoma" pitchFamily="2"/>
+                </a:rPr>
+                <a:t>counter</a:t>
+              </a:r>
+            </a:p>
+            <a:p>
+              <a:pPr algn="ctr">
+                <a:spcBef>
+                  <a:spcPts val="0"/>
+                </a:spcBef>
+                <a:spcAft>
+                  <a:spcPts val="0"/>
+                </a:spcAft>
+                <a:defRPr/>
+              </a:pPr>
+              <a:r>
+                <a:rPr lang="en-US" sz="1200" dirty="0" smtClean="0">
+                  <a:solidFill>
+                    <a:srgbClr val="FFFFFF"/>
+                  </a:solidFill>
+                  <a:latin typeface="Arial" pitchFamily="34"/>
+                  <a:ea typeface="Arial Unicode MS" pitchFamily="2"/>
+                  <a:cs typeface="Tahoma" pitchFamily="2"/>
+                </a:rPr>
+                <a:t>(PAPI</a:t>
+              </a:r>
+              <a:r>
+                <a:rPr lang="en-US" sz="1200" dirty="0">
+                  <a:solidFill>
+                    <a:srgbClr val="FFFFFF"/>
+                  </a:solidFill>
+                  <a:latin typeface="Arial" pitchFamily="34"/>
+                  <a:ea typeface="Arial Unicode MS" pitchFamily="2"/>
+                  <a:cs typeface="Tahoma" pitchFamily="2"/>
+                </a:rPr>
+                <a:t>, </a:t>
+              </a:r>
+              <a:r>
+                <a:rPr lang="en-US" sz="1200" dirty="0" err="1" smtClean="0">
+                  <a:solidFill>
+                    <a:srgbClr val="FFFFFF"/>
+                  </a:solidFill>
+                  <a:latin typeface="Arial" pitchFamily="34"/>
+                  <a:ea typeface="Arial Unicode MS" pitchFamily="2"/>
+                  <a:cs typeface="Tahoma" pitchFamily="2"/>
+                </a:rPr>
+                <a:t>rusage</a:t>
+              </a:r>
+              <a:r>
+                <a:rPr lang="en-US" sz="1200" dirty="0" smtClean="0">
+                  <a:solidFill>
+                    <a:srgbClr val="FFFFFF"/>
+                  </a:solidFill>
+                  <a:latin typeface="Arial" pitchFamily="34"/>
+                  <a:ea typeface="Arial Unicode MS" pitchFamily="2"/>
+                  <a:cs typeface="Tahoma" pitchFamily="2"/>
+                </a:rPr>
+                <a:t>, PERF, plugins)</a:t>
+              </a:r>
+              <a:endParaRPr lang="en-US" sz="1200" dirty="0">
+                <a:solidFill>
+                  <a:srgbClr val="FFFFFF"/>
+                </a:solidFill>
+                <a:latin typeface="Arial" pitchFamily="34"/>
+                <a:ea typeface="Arial Unicode MS" pitchFamily="2"/>
+                <a:cs typeface="Tahoma" pitchFamily="2"/>
+              </a:endParaRPr>
+            </a:p>
+          </p:txBody>
+        </p:sp>
       </p:grpSp>
     </p:spTree>
     <p:extLst>
@@ -10657,7 +10641,7 @@
     </a:clrScheme>
     <a:fontScheme name="Office Theme">
       <a:majorFont>
-        <a:latin typeface="Calibri Light" panose="020F0302020204030204"/>
+        <a:latin typeface="Calibri Light"/>
         <a:ea typeface=""/>
         <a:cs typeface=""/>
         <a:font script="Jpan" typeface="ＭＳ Ｐゴシック"/>
@@ -10692,7 +10676,7 @@
         <a:font script="Geor" typeface="Sylfaen"/>
       </a:majorFont>
       <a:minorFont>
-        <a:latin typeface="Calibri" panose="020F0502020204030204"/>
+        <a:latin typeface="Calibri"/>
         <a:ea typeface=""/>
         <a:cs typeface=""/>
         <a:font script="Jpan" typeface="ＭＳ Ｐゴシック"/>
@@ -10869,7 +10853,7 @@
   <a:extraClrSchemeLst/>
   <a:extLst>
     <a:ext uri="{05A4C25C-085E-4340-85A3-A5531E510DB2}">
-      <thm15:themeFamily xmlns:thm15="http://schemas.microsoft.com/office/thememl/2012/main" xmlns="" name="Office Theme" id="{62F939B6-93AF-4DB8-9C6B-D6C7DFDC589F}" vid="{4A3C46E8-61CC-4603-A589-7422A47A8E4A}"/>
+      <thm15:themeFamily xmlns="" xmlns:thm15="http://schemas.microsoft.com/office/thememl/2012/main" name="Office Theme" id="{62F939B6-93AF-4DB8-9C6B-D6C7DFDC589F}" vid="{4A3C46E8-61CC-4603-A589-7422A47A8E4A}"/>
     </a:ext>
   </a:extLst>
 </a:theme>

</xml_diff>